<commit_message>
Levels added and collisions fixed
</commit_message>
<xml_diff>
--- a/Nea_game_files/Buttons/Buttons.pptx
+++ b/Nea_game_files/Buttons/Buttons.pptx
@@ -5,21 +5,22 @@
     <p:sldMasterId id="2147483659" r:id="rId1"/>
   </p:sldMasterIdLst>
   <p:notesMasterIdLst>
-    <p:notesMasterId r:id="rId7"/>
+    <p:notesMasterId r:id="rId8"/>
   </p:notesMasterIdLst>
   <p:sldIdLst>
     <p:sldId id="256" r:id="rId2"/>
     <p:sldId id="257" r:id="rId3"/>
     <p:sldId id="258" r:id="rId4"/>
-    <p:sldId id="259" r:id="rId5"/>
-    <p:sldId id="260" r:id="rId6"/>
+    <p:sldId id="261" r:id="rId5"/>
+    <p:sldId id="259" r:id="rId6"/>
+    <p:sldId id="260" r:id="rId7"/>
   </p:sldIdLst>
   <p:sldSz cx="9144000" cy="5143500" type="screen16x9"/>
   <p:notesSz cx="6858000" cy="9144000"/>
   <p:embeddedFontLst>
     <p:embeddedFont>
       <p:font typeface="Press Start 2P" panose="020B0604020202020204" charset="0"/>
-      <p:regular r:id="rId8"/>
+      <p:regular r:id="rId9"/>
     </p:embeddedFont>
   </p:embeddedFontLst>
   <p:defaultTextStyle>
@@ -6668,7 +6669,7 @@
               </a:spcAft>
               <a:buNone/>
             </a:pPr>
-            <a:endParaRPr/>
+            <a:endParaRPr dirty="0"/>
           </a:p>
         </p:txBody>
       </p:sp>
@@ -7436,6 +7437,282 @@
           </a:prstGeom>
         </p:spPr>
       </p:pic>
+      <p:sp>
+        <p:nvSpPr>
+          <p:cNvPr id="12" name="Google Shape;72;p16">
+            <a:extLst>
+              <a:ext uri="{FF2B5EF4-FFF2-40B4-BE49-F238E27FC236}">
+                <a16:creationId xmlns:a16="http://schemas.microsoft.com/office/drawing/2014/main" id="{6E000FFE-6C49-3BBA-90C6-A336212404BE}"/>
+              </a:ext>
+            </a:extLst>
+          </p:cNvPr>
+          <p:cNvSpPr/>
+          <p:nvPr/>
+        </p:nvSpPr>
+        <p:spPr>
+          <a:xfrm>
+            <a:off x="165657" y="1284151"/>
+            <a:ext cx="1523809" cy="533333"/>
+          </a:xfrm>
+          <a:prstGeom prst="rect">
+            <a:avLst/>
+          </a:prstGeom>
+          <a:solidFill>
+            <a:srgbClr val="433232"/>
+          </a:solidFill>
+          <a:ln w="9525" cap="flat" cmpd="sng">
+            <a:solidFill>
+              <a:schemeClr val="dk1"/>
+            </a:solidFill>
+            <a:prstDash val="solid"/>
+            <a:round/>
+            <a:headEnd type="none" w="sm" len="sm"/>
+            <a:tailEnd type="none" w="sm" len="sm"/>
+          </a:ln>
+        </p:spPr>
+        <p:txBody>
+          <a:bodyPr spcFirstLastPara="1" wrap="square" lIns="91425" tIns="91425" rIns="91425" bIns="91425" anchor="ctr" anchorCtr="0">
+            <a:noAutofit/>
+          </a:bodyPr>
+          <a:lstStyle/>
+          <a:p>
+            <a:pPr marL="0" lvl="0" indent="0" algn="l" rtl="0">
+              <a:spcBef>
+                <a:spcPts val="0"/>
+              </a:spcBef>
+              <a:spcAft>
+                <a:spcPts val="0"/>
+              </a:spcAft>
+              <a:buNone/>
+            </a:pPr>
+            <a:endParaRPr/>
+          </a:p>
+        </p:txBody>
+      </p:sp>
+      <p:sp>
+        <p:nvSpPr>
+          <p:cNvPr id="18" name="Google Shape;73;p16">
+            <a:extLst>
+              <a:ext uri="{FF2B5EF4-FFF2-40B4-BE49-F238E27FC236}">
+                <a16:creationId xmlns:a16="http://schemas.microsoft.com/office/drawing/2014/main" id="{4C19FBAB-537E-5CA5-F34C-6956426A9698}"/>
+              </a:ext>
+            </a:extLst>
+          </p:cNvPr>
+          <p:cNvSpPr/>
+          <p:nvPr/>
+        </p:nvSpPr>
+        <p:spPr>
+          <a:xfrm>
+            <a:off x="228664" y="1349217"/>
+            <a:ext cx="1397794" cy="403200"/>
+          </a:xfrm>
+          <a:prstGeom prst="rect">
+            <a:avLst/>
+          </a:prstGeom>
+          <a:solidFill>
+            <a:srgbClr val="00B0F0"/>
+          </a:solidFill>
+          <a:ln w="38100" cap="flat" cmpd="sng">
+            <a:solidFill>
+              <a:schemeClr val="lt1"/>
+            </a:solidFill>
+            <a:prstDash val="solid"/>
+            <a:round/>
+            <a:headEnd type="none" w="sm" len="sm"/>
+            <a:tailEnd type="none" w="sm" len="sm"/>
+          </a:ln>
+        </p:spPr>
+        <p:txBody>
+          <a:bodyPr spcFirstLastPara="1" wrap="square" lIns="91425" tIns="91425" rIns="91425" bIns="91425" anchor="ctr" anchorCtr="0">
+            <a:noAutofit/>
+          </a:bodyPr>
+          <a:lstStyle/>
+          <a:p>
+            <a:pPr marL="0" lvl="0" indent="0" algn="ctr" rtl="0">
+              <a:spcBef>
+                <a:spcPts val="0"/>
+              </a:spcBef>
+              <a:spcAft>
+                <a:spcPts val="0"/>
+              </a:spcAft>
+              <a:buNone/>
+            </a:pPr>
+            <a:r>
+              <a:rPr lang="en-GB" sz="1200" dirty="0">
+                <a:solidFill>
+                  <a:schemeClr val="lt1"/>
+                </a:solidFill>
+                <a:effectLst>
+                  <a:outerShdw blurRad="38100" dist="38100" dir="2700000" algn="tl">
+                    <a:srgbClr val="000000">
+                      <a:alpha val="43137"/>
+                    </a:srgbClr>
+                  </a:outerShdw>
+                </a:effectLst>
+                <a:latin typeface="Press Start 2P"/>
+                <a:ea typeface="Press Start 2P"/>
+                <a:cs typeface="Press Start 2P"/>
+                <a:sym typeface="Press Start 2P"/>
+              </a:rPr>
+              <a:t>SAVE</a:t>
+            </a:r>
+            <a:endParaRPr sz="1200" dirty="0">
+              <a:solidFill>
+                <a:schemeClr val="lt1"/>
+              </a:solidFill>
+              <a:effectLst>
+                <a:outerShdw blurRad="38100" dist="38100" dir="2700000" algn="tl">
+                  <a:srgbClr val="000000">
+                    <a:alpha val="43137"/>
+                  </a:srgbClr>
+                </a:outerShdw>
+              </a:effectLst>
+              <a:latin typeface="Press Start 2P"/>
+              <a:ea typeface="Press Start 2P"/>
+              <a:cs typeface="Press Start 2P"/>
+              <a:sym typeface="Press Start 2P"/>
+            </a:endParaRPr>
+          </a:p>
+        </p:txBody>
+      </p:sp>
+      <p:sp>
+        <p:nvSpPr>
+          <p:cNvPr id="20" name="Google Shape;72;p16">
+            <a:extLst>
+              <a:ext uri="{FF2B5EF4-FFF2-40B4-BE49-F238E27FC236}">
+                <a16:creationId xmlns:a16="http://schemas.microsoft.com/office/drawing/2014/main" id="{718C9548-0142-0942-B490-7C25E4777DDF}"/>
+              </a:ext>
+            </a:extLst>
+          </p:cNvPr>
+          <p:cNvSpPr/>
+          <p:nvPr/>
+        </p:nvSpPr>
+        <p:spPr>
+          <a:xfrm>
+            <a:off x="1794414" y="1284151"/>
+            <a:ext cx="1523809" cy="533333"/>
+          </a:xfrm>
+          <a:prstGeom prst="rect">
+            <a:avLst/>
+          </a:prstGeom>
+          <a:solidFill>
+            <a:srgbClr val="433232"/>
+          </a:solidFill>
+          <a:ln w="9525" cap="flat" cmpd="sng">
+            <a:solidFill>
+              <a:schemeClr val="dk1"/>
+            </a:solidFill>
+            <a:prstDash val="solid"/>
+            <a:round/>
+            <a:headEnd type="none" w="sm" len="sm"/>
+            <a:tailEnd type="none" w="sm" len="sm"/>
+          </a:ln>
+        </p:spPr>
+        <p:txBody>
+          <a:bodyPr spcFirstLastPara="1" wrap="square" lIns="91425" tIns="91425" rIns="91425" bIns="91425" anchor="ctr" anchorCtr="0">
+            <a:noAutofit/>
+          </a:bodyPr>
+          <a:lstStyle/>
+          <a:p>
+            <a:pPr marL="0" lvl="0" indent="0" algn="l" rtl="0">
+              <a:spcBef>
+                <a:spcPts val="0"/>
+              </a:spcBef>
+              <a:spcAft>
+                <a:spcPts val="0"/>
+              </a:spcAft>
+              <a:buNone/>
+            </a:pPr>
+            <a:endParaRPr/>
+          </a:p>
+        </p:txBody>
+      </p:sp>
+      <p:sp>
+        <p:nvSpPr>
+          <p:cNvPr id="22" name="Google Shape;73;p16">
+            <a:extLst>
+              <a:ext uri="{FF2B5EF4-FFF2-40B4-BE49-F238E27FC236}">
+                <a16:creationId xmlns:a16="http://schemas.microsoft.com/office/drawing/2014/main" id="{26F1A10C-3723-AD02-884E-4BF909D37EFA}"/>
+              </a:ext>
+            </a:extLst>
+          </p:cNvPr>
+          <p:cNvSpPr/>
+          <p:nvPr/>
+        </p:nvSpPr>
+        <p:spPr>
+          <a:xfrm>
+            <a:off x="1857421" y="1349217"/>
+            <a:ext cx="1397794" cy="403200"/>
+          </a:xfrm>
+          <a:prstGeom prst="rect">
+            <a:avLst/>
+          </a:prstGeom>
+          <a:solidFill>
+            <a:srgbClr val="00B0F0"/>
+          </a:solidFill>
+          <a:ln w="38100" cap="flat" cmpd="sng">
+            <a:solidFill>
+              <a:schemeClr val="lt1"/>
+            </a:solidFill>
+            <a:prstDash val="solid"/>
+            <a:round/>
+            <a:headEnd type="none" w="sm" len="sm"/>
+            <a:tailEnd type="none" w="sm" len="sm"/>
+          </a:ln>
+        </p:spPr>
+        <p:txBody>
+          <a:bodyPr spcFirstLastPara="1" wrap="square" lIns="91425" tIns="91425" rIns="91425" bIns="91425" anchor="ctr" anchorCtr="0">
+            <a:noAutofit/>
+          </a:bodyPr>
+          <a:lstStyle/>
+          <a:p>
+            <a:pPr marL="0" lvl="0" indent="0" algn="ctr" rtl="0">
+              <a:spcBef>
+                <a:spcPts val="0"/>
+              </a:spcBef>
+              <a:spcAft>
+                <a:spcPts val="0"/>
+              </a:spcAft>
+              <a:buNone/>
+            </a:pPr>
+            <a:r>
+              <a:rPr lang="en-GB" sz="1200">
+                <a:solidFill>
+                  <a:schemeClr val="lt1"/>
+                </a:solidFill>
+                <a:effectLst>
+                  <a:outerShdw blurRad="38100" dist="38100" dir="2700000" algn="tl">
+                    <a:srgbClr val="000000">
+                      <a:alpha val="43137"/>
+                    </a:srgbClr>
+                  </a:outerShdw>
+                </a:effectLst>
+                <a:latin typeface="Press Start 2P"/>
+                <a:ea typeface="Press Start 2P"/>
+                <a:cs typeface="Press Start 2P"/>
+                <a:sym typeface="Press Start 2P"/>
+              </a:rPr>
+              <a:t>LOAD</a:t>
+            </a:r>
+            <a:endParaRPr sz="1200" dirty="0">
+              <a:solidFill>
+                <a:schemeClr val="lt1"/>
+              </a:solidFill>
+              <a:effectLst>
+                <a:outerShdw blurRad="38100" dist="38100" dir="2700000" algn="tl">
+                  <a:srgbClr val="000000">
+                    <a:alpha val="43137"/>
+                  </a:srgbClr>
+                </a:outerShdw>
+              </a:effectLst>
+              <a:latin typeface="Press Start 2P"/>
+              <a:ea typeface="Press Start 2P"/>
+              <a:cs typeface="Press Start 2P"/>
+              <a:sym typeface="Press Start 2P"/>
+            </a:endParaRPr>
+          </a:p>
+        </p:txBody>
+      </p:sp>
     </p:spTree>
   </p:cSld>
   <p:clrMapOvr>
@@ -7445,6 +7722,36 @@
 </file>
 
 <file path=ppt/slides/slide4.xml><?xml version="1.0" encoding="utf-8"?>
+<p:sld xmlns:a="http://schemas.openxmlformats.org/drawingml/2006/main" xmlns:r="http://schemas.openxmlformats.org/officeDocument/2006/relationships" xmlns:p="http://schemas.openxmlformats.org/presentationml/2006/main">
+  <p:cSld>
+    <p:spTree>
+      <p:nvGrpSpPr>
+        <p:cNvPr id="1" name=""/>
+        <p:cNvGrpSpPr/>
+        <p:nvPr/>
+      </p:nvGrpSpPr>
+      <p:grpSpPr>
+        <a:xfrm>
+          <a:off x="0" y="0"/>
+          <a:ext cx="0" cy="0"/>
+          <a:chOff x="0" y="0"/>
+          <a:chExt cx="0" cy="0"/>
+        </a:xfrm>
+      </p:grpSpPr>
+    </p:spTree>
+    <p:extLst>
+      <p:ext uri="{BB962C8B-B14F-4D97-AF65-F5344CB8AC3E}">
+        <p14:creationId xmlns:p14="http://schemas.microsoft.com/office/powerpoint/2010/main" val="2099291222"/>
+      </p:ext>
+    </p:extLst>
+  </p:cSld>
+  <p:clrMapOvr>
+    <a:masterClrMapping/>
+  </p:clrMapOvr>
+</p:sld>
+</file>
+
+<file path=ppt/slides/slide5.xml><?xml version="1.0" encoding="utf-8"?>
 <p:sld xmlns:a="http://schemas.openxmlformats.org/drawingml/2006/main" xmlns:r="http://schemas.openxmlformats.org/officeDocument/2006/relationships" xmlns:p="http://schemas.openxmlformats.org/presentationml/2006/main">
   <p:cSld>
     <p:spTree>
@@ -7581,7 +7888,7 @@
 </p:sld>
 </file>
 
-<file path=ppt/slides/slide5.xml><?xml version="1.0" encoding="utf-8"?>
+<file path=ppt/slides/slide6.xml><?xml version="1.0" encoding="utf-8"?>
 <p:sld xmlns:a="http://schemas.openxmlformats.org/drawingml/2006/main" xmlns:r="http://schemas.openxmlformats.org/officeDocument/2006/relationships" xmlns:p="http://schemas.openxmlformats.org/presentationml/2006/main">
   <p:cSld>
     <p:spTree>

</xml_diff>

<commit_message>
Pause menu added + Change of level backgrounds implemented
</commit_message>
<xml_diff>
--- a/Nea_game_files/Buttons/Buttons.pptx
+++ b/Nea_game_files/Buttons/Buttons.pptx
@@ -19,8 +19,12 @@
   <p:notesSz cx="6858000" cy="9144000"/>
   <p:embeddedFontLst>
     <p:embeddedFont>
+      <p:font typeface="Old English Text MT" panose="03040902040508030806" pitchFamily="66" charset="0"/>
+      <p:regular r:id="rId9"/>
+    </p:embeddedFont>
+    <p:embeddedFont>
       <p:font typeface="Press Start 2P" panose="020B0604020202020204" charset="0"/>
-      <p:regular r:id="rId9"/>
+      <p:regular r:id="rId10"/>
     </p:embeddedFont>
   </p:embeddedFontLst>
   <p:defaultTextStyle>
@@ -6761,558 +6765,6 @@
       </p:sp>
       <p:sp>
         <p:nvSpPr>
-          <p:cNvPr id="8" name="Google Shape;72;p16">
-            <a:extLst>
-              <a:ext uri="{FF2B5EF4-FFF2-40B4-BE49-F238E27FC236}">
-                <a16:creationId xmlns:a16="http://schemas.microsoft.com/office/drawing/2014/main" id="{3658A06D-2D03-7C8E-FA92-93EBAB4C86B2}"/>
-              </a:ext>
-            </a:extLst>
-          </p:cNvPr>
-          <p:cNvSpPr/>
-          <p:nvPr/>
-        </p:nvSpPr>
-        <p:spPr>
-          <a:xfrm>
-            <a:off x="9791912" y="4605392"/>
-            <a:ext cx="1523809" cy="533333"/>
-          </a:xfrm>
-          <a:prstGeom prst="rect">
-            <a:avLst/>
-          </a:prstGeom>
-          <a:solidFill>
-            <a:srgbClr val="433232"/>
-          </a:solidFill>
-          <a:ln w="9525" cap="flat" cmpd="sng">
-            <a:solidFill>
-              <a:schemeClr val="dk1"/>
-            </a:solidFill>
-            <a:prstDash val="solid"/>
-            <a:round/>
-            <a:headEnd type="none" w="sm" len="sm"/>
-            <a:tailEnd type="none" w="sm" len="sm"/>
-          </a:ln>
-        </p:spPr>
-        <p:txBody>
-          <a:bodyPr spcFirstLastPara="1" wrap="square" lIns="91425" tIns="91425" rIns="91425" bIns="91425" anchor="ctr" anchorCtr="0">
-            <a:noAutofit/>
-          </a:bodyPr>
-          <a:lstStyle/>
-          <a:p>
-            <a:pPr marL="0" lvl="0" indent="0" algn="l" rtl="0">
-              <a:spcBef>
-                <a:spcPts val="0"/>
-              </a:spcBef>
-              <a:spcAft>
-                <a:spcPts val="0"/>
-              </a:spcAft>
-              <a:buNone/>
-            </a:pPr>
-            <a:endParaRPr/>
-          </a:p>
-        </p:txBody>
-      </p:sp>
-      <p:sp>
-        <p:nvSpPr>
-          <p:cNvPr id="9" name="Google Shape;72;p16">
-            <a:extLst>
-              <a:ext uri="{FF2B5EF4-FFF2-40B4-BE49-F238E27FC236}">
-                <a16:creationId xmlns:a16="http://schemas.microsoft.com/office/drawing/2014/main" id="{4B6E7CE8-DB5A-981F-CFD2-FF153211753A}"/>
-              </a:ext>
-            </a:extLst>
-          </p:cNvPr>
-          <p:cNvSpPr/>
-          <p:nvPr/>
-        </p:nvSpPr>
-        <p:spPr>
-          <a:xfrm>
-            <a:off x="8268103" y="4605391"/>
-            <a:ext cx="1523809" cy="533333"/>
-          </a:xfrm>
-          <a:prstGeom prst="rect">
-            <a:avLst/>
-          </a:prstGeom>
-          <a:solidFill>
-            <a:srgbClr val="433232"/>
-          </a:solidFill>
-          <a:ln w="9525" cap="flat" cmpd="sng">
-            <a:solidFill>
-              <a:schemeClr val="dk1"/>
-            </a:solidFill>
-            <a:prstDash val="solid"/>
-            <a:round/>
-            <a:headEnd type="none" w="sm" len="sm"/>
-            <a:tailEnd type="none" w="sm" len="sm"/>
-          </a:ln>
-        </p:spPr>
-        <p:txBody>
-          <a:bodyPr spcFirstLastPara="1" wrap="square" lIns="91425" tIns="91425" rIns="91425" bIns="91425" anchor="ctr" anchorCtr="0">
-            <a:noAutofit/>
-          </a:bodyPr>
-          <a:lstStyle/>
-          <a:p>
-            <a:pPr marL="0" lvl="0" indent="0" algn="l" rtl="0">
-              <a:spcBef>
-                <a:spcPts val="0"/>
-              </a:spcBef>
-              <a:spcAft>
-                <a:spcPts val="0"/>
-              </a:spcAft>
-              <a:buNone/>
-            </a:pPr>
-            <a:endParaRPr dirty="0"/>
-          </a:p>
-        </p:txBody>
-      </p:sp>
-      <p:sp>
-        <p:nvSpPr>
-          <p:cNvPr id="10" name="Google Shape;72;p16">
-            <a:extLst>
-              <a:ext uri="{FF2B5EF4-FFF2-40B4-BE49-F238E27FC236}">
-                <a16:creationId xmlns:a16="http://schemas.microsoft.com/office/drawing/2014/main" id="{CE9F338A-A7DB-4712-5725-20A49B163ADD}"/>
-              </a:ext>
-            </a:extLst>
-          </p:cNvPr>
-          <p:cNvSpPr/>
-          <p:nvPr/>
-        </p:nvSpPr>
-        <p:spPr>
-          <a:xfrm>
-            <a:off x="8268103" y="4081610"/>
-            <a:ext cx="1523809" cy="533333"/>
-          </a:xfrm>
-          <a:prstGeom prst="rect">
-            <a:avLst/>
-          </a:prstGeom>
-          <a:solidFill>
-            <a:srgbClr val="433232"/>
-          </a:solidFill>
-          <a:ln w="9525" cap="flat" cmpd="sng">
-            <a:solidFill>
-              <a:schemeClr val="dk1"/>
-            </a:solidFill>
-            <a:prstDash val="solid"/>
-            <a:round/>
-            <a:headEnd type="none" w="sm" len="sm"/>
-            <a:tailEnd type="none" w="sm" len="sm"/>
-          </a:ln>
-        </p:spPr>
-        <p:txBody>
-          <a:bodyPr spcFirstLastPara="1" wrap="square" lIns="91425" tIns="91425" rIns="91425" bIns="91425" anchor="ctr" anchorCtr="0">
-            <a:noAutofit/>
-          </a:bodyPr>
-          <a:lstStyle/>
-          <a:p>
-            <a:pPr marL="0" lvl="0" indent="0" algn="l" rtl="0">
-              <a:spcBef>
-                <a:spcPts val="0"/>
-              </a:spcBef>
-              <a:spcAft>
-                <a:spcPts val="0"/>
-              </a:spcAft>
-              <a:buNone/>
-            </a:pPr>
-            <a:endParaRPr/>
-          </a:p>
-        </p:txBody>
-      </p:sp>
-      <p:sp>
-        <p:nvSpPr>
-          <p:cNvPr id="11" name="Google Shape;72;p16">
-            <a:extLst>
-              <a:ext uri="{FF2B5EF4-FFF2-40B4-BE49-F238E27FC236}">
-                <a16:creationId xmlns:a16="http://schemas.microsoft.com/office/drawing/2014/main" id="{8D10DDEF-34AE-3133-AF9E-19D35EDCA7E8}"/>
-              </a:ext>
-            </a:extLst>
-          </p:cNvPr>
-          <p:cNvSpPr/>
-          <p:nvPr/>
-        </p:nvSpPr>
-        <p:spPr>
-          <a:xfrm>
-            <a:off x="9791911" y="4081610"/>
-            <a:ext cx="1523809" cy="533333"/>
-          </a:xfrm>
-          <a:prstGeom prst="rect">
-            <a:avLst/>
-          </a:prstGeom>
-          <a:solidFill>
-            <a:srgbClr val="433232"/>
-          </a:solidFill>
-          <a:ln w="9525" cap="flat" cmpd="sng">
-            <a:solidFill>
-              <a:schemeClr val="dk1"/>
-            </a:solidFill>
-            <a:prstDash val="solid"/>
-            <a:round/>
-            <a:headEnd type="none" w="sm" len="sm"/>
-            <a:tailEnd type="none" w="sm" len="sm"/>
-          </a:ln>
-        </p:spPr>
-        <p:txBody>
-          <a:bodyPr spcFirstLastPara="1" wrap="square" lIns="91425" tIns="91425" rIns="91425" bIns="91425" anchor="ctr" anchorCtr="0">
-            <a:noAutofit/>
-          </a:bodyPr>
-          <a:lstStyle/>
-          <a:p>
-            <a:pPr marL="0" lvl="0" indent="0" algn="l" rtl="0">
-              <a:spcBef>
-                <a:spcPts val="0"/>
-              </a:spcBef>
-              <a:spcAft>
-                <a:spcPts val="0"/>
-              </a:spcAft>
-              <a:buNone/>
-            </a:pPr>
-            <a:endParaRPr/>
-          </a:p>
-        </p:txBody>
-      </p:sp>
-      <p:sp>
-        <p:nvSpPr>
-          <p:cNvPr id="13" name="Google Shape;73;p16">
-            <a:extLst>
-              <a:ext uri="{FF2B5EF4-FFF2-40B4-BE49-F238E27FC236}">
-                <a16:creationId xmlns:a16="http://schemas.microsoft.com/office/drawing/2014/main" id="{622693EA-C5D4-D3BC-07F0-01EC84506BC4}"/>
-              </a:ext>
-            </a:extLst>
-          </p:cNvPr>
-          <p:cNvSpPr/>
-          <p:nvPr/>
-        </p:nvSpPr>
-        <p:spPr>
-          <a:xfrm>
-            <a:off x="927561" y="2417455"/>
-            <a:ext cx="1397794" cy="403200"/>
-          </a:xfrm>
-          <a:prstGeom prst="rect">
-            <a:avLst/>
-          </a:prstGeom>
-          <a:solidFill>
-            <a:srgbClr val="00B050"/>
-          </a:solidFill>
-          <a:ln w="38100" cap="flat" cmpd="sng">
-            <a:solidFill>
-              <a:schemeClr val="lt1"/>
-            </a:solidFill>
-            <a:prstDash val="solid"/>
-            <a:round/>
-            <a:headEnd type="none" w="sm" len="sm"/>
-            <a:tailEnd type="none" w="sm" len="sm"/>
-          </a:ln>
-        </p:spPr>
-        <p:txBody>
-          <a:bodyPr spcFirstLastPara="1" wrap="square" lIns="91425" tIns="91425" rIns="91425" bIns="91425" anchor="ctr" anchorCtr="0">
-            <a:noAutofit/>
-          </a:bodyPr>
-          <a:lstStyle/>
-          <a:p>
-            <a:pPr marL="0" lvl="0" indent="0" algn="ctr" rtl="0">
-              <a:spcBef>
-                <a:spcPts val="0"/>
-              </a:spcBef>
-              <a:spcAft>
-                <a:spcPts val="0"/>
-              </a:spcAft>
-              <a:buNone/>
-            </a:pPr>
-            <a:r>
-              <a:rPr lang="en-GB" sz="1200" dirty="0">
-                <a:solidFill>
-                  <a:schemeClr val="lt1"/>
-                </a:solidFill>
-                <a:effectLst>
-                  <a:outerShdw blurRad="38100" dist="38100" dir="2700000" algn="tl">
-                    <a:srgbClr val="000000">
-                      <a:alpha val="43137"/>
-                    </a:srgbClr>
-                  </a:outerShdw>
-                </a:effectLst>
-                <a:latin typeface="Press Start 2P"/>
-                <a:ea typeface="Press Start 2P"/>
-                <a:cs typeface="Press Start 2P"/>
-                <a:sym typeface="Press Start 2P"/>
-              </a:rPr>
-              <a:t>START</a:t>
-            </a:r>
-            <a:endParaRPr sz="1200" dirty="0">
-              <a:solidFill>
-                <a:schemeClr val="lt1"/>
-              </a:solidFill>
-              <a:effectLst>
-                <a:outerShdw blurRad="38100" dist="38100" dir="2700000" algn="tl">
-                  <a:srgbClr val="000000">
-                    <a:alpha val="43137"/>
-                  </a:srgbClr>
-                </a:outerShdw>
-              </a:effectLst>
-              <a:latin typeface="Press Start 2P"/>
-              <a:ea typeface="Press Start 2P"/>
-              <a:cs typeface="Press Start 2P"/>
-              <a:sym typeface="Press Start 2P"/>
-            </a:endParaRPr>
-          </a:p>
-        </p:txBody>
-      </p:sp>
-      <p:sp>
-        <p:nvSpPr>
-          <p:cNvPr id="14" name="Google Shape;73;p16">
-            <a:extLst>
-              <a:ext uri="{FF2B5EF4-FFF2-40B4-BE49-F238E27FC236}">
-                <a16:creationId xmlns:a16="http://schemas.microsoft.com/office/drawing/2014/main" id="{DF2C3642-D488-0F20-E79F-EFAF4A3ACDAE}"/>
-              </a:ext>
-            </a:extLst>
-          </p:cNvPr>
-          <p:cNvSpPr/>
-          <p:nvPr/>
-        </p:nvSpPr>
-        <p:spPr>
-          <a:xfrm>
-            <a:off x="2333682" y="2820655"/>
-            <a:ext cx="1397794" cy="403200"/>
-          </a:xfrm>
-          <a:prstGeom prst="rect">
-            <a:avLst/>
-          </a:prstGeom>
-          <a:solidFill>
-            <a:srgbClr val="00B050"/>
-          </a:solidFill>
-          <a:ln w="38100" cap="flat" cmpd="sng">
-            <a:solidFill>
-              <a:schemeClr val="lt1"/>
-            </a:solidFill>
-            <a:prstDash val="solid"/>
-            <a:round/>
-            <a:headEnd type="none" w="sm" len="sm"/>
-            <a:tailEnd type="none" w="sm" len="sm"/>
-          </a:ln>
-        </p:spPr>
-        <p:txBody>
-          <a:bodyPr spcFirstLastPara="1" wrap="square" lIns="91425" tIns="91425" rIns="91425" bIns="91425" anchor="ctr" anchorCtr="0">
-            <a:noAutofit/>
-          </a:bodyPr>
-          <a:lstStyle/>
-          <a:p>
-            <a:pPr marL="0" lvl="0" indent="0" algn="ctr" rtl="0">
-              <a:spcBef>
-                <a:spcPts val="0"/>
-              </a:spcBef>
-              <a:spcAft>
-                <a:spcPts val="0"/>
-              </a:spcAft>
-              <a:buNone/>
-            </a:pPr>
-            <a:r>
-              <a:rPr lang="en-GB" sz="1200" dirty="0">
-                <a:solidFill>
-                  <a:schemeClr val="lt1"/>
-                </a:solidFill>
-                <a:effectLst>
-                  <a:outerShdw blurRad="38100" dist="38100" dir="2700000" algn="tl">
-                    <a:srgbClr val="000000">
-                      <a:alpha val="43137"/>
-                    </a:srgbClr>
-                  </a:outerShdw>
-                </a:effectLst>
-                <a:latin typeface="Press Start 2P"/>
-                <a:ea typeface="Press Start 2P"/>
-                <a:cs typeface="Press Start 2P"/>
-                <a:sym typeface="Press Start 2P"/>
-              </a:rPr>
-              <a:t>START</a:t>
-            </a:r>
-            <a:endParaRPr sz="1200" dirty="0">
-              <a:solidFill>
-                <a:schemeClr val="lt1"/>
-              </a:solidFill>
-              <a:effectLst>
-                <a:outerShdw blurRad="38100" dist="38100" dir="2700000" algn="tl">
-                  <a:srgbClr val="000000">
-                    <a:alpha val="43137"/>
-                  </a:srgbClr>
-                </a:outerShdw>
-              </a:effectLst>
-              <a:latin typeface="Press Start 2P"/>
-              <a:ea typeface="Press Start 2P"/>
-              <a:cs typeface="Press Start 2P"/>
-              <a:sym typeface="Press Start 2P"/>
-            </a:endParaRPr>
-          </a:p>
-        </p:txBody>
-      </p:sp>
-      <p:sp>
-        <p:nvSpPr>
-          <p:cNvPr id="15" name="Google Shape;73;p16">
-            <a:extLst>
-              <a:ext uri="{FF2B5EF4-FFF2-40B4-BE49-F238E27FC236}">
-                <a16:creationId xmlns:a16="http://schemas.microsoft.com/office/drawing/2014/main" id="{12EBFF90-5C7B-54C5-DC5D-0A6620AA00B8}"/>
-              </a:ext>
-            </a:extLst>
-          </p:cNvPr>
-          <p:cNvSpPr/>
-          <p:nvPr/>
-        </p:nvSpPr>
-        <p:spPr>
-          <a:xfrm>
-            <a:off x="935888" y="2820655"/>
-            <a:ext cx="1397794" cy="403200"/>
-          </a:xfrm>
-          <a:prstGeom prst="rect">
-            <a:avLst/>
-          </a:prstGeom>
-          <a:solidFill>
-            <a:srgbClr val="00B050"/>
-          </a:solidFill>
-          <a:ln w="38100" cap="flat" cmpd="sng">
-            <a:solidFill>
-              <a:schemeClr val="lt1"/>
-            </a:solidFill>
-            <a:prstDash val="solid"/>
-            <a:round/>
-            <a:headEnd type="none" w="sm" len="sm"/>
-            <a:tailEnd type="none" w="sm" len="sm"/>
-          </a:ln>
-        </p:spPr>
-        <p:txBody>
-          <a:bodyPr spcFirstLastPara="1" wrap="square" lIns="91425" tIns="91425" rIns="91425" bIns="91425" anchor="ctr" anchorCtr="0">
-            <a:noAutofit/>
-          </a:bodyPr>
-          <a:lstStyle/>
-          <a:p>
-            <a:pPr marL="0" lvl="0" indent="0" algn="ctr" rtl="0">
-              <a:spcBef>
-                <a:spcPts val="0"/>
-              </a:spcBef>
-              <a:spcAft>
-                <a:spcPts val="0"/>
-              </a:spcAft>
-              <a:buNone/>
-            </a:pPr>
-            <a:r>
-              <a:rPr lang="en-GB" sz="1200" dirty="0">
-                <a:solidFill>
-                  <a:schemeClr val="lt1"/>
-                </a:solidFill>
-                <a:effectLst>
-                  <a:outerShdw blurRad="38100" dist="38100" dir="2700000" algn="tl">
-                    <a:srgbClr val="000000">
-                      <a:alpha val="43137"/>
-                    </a:srgbClr>
-                  </a:outerShdw>
-                </a:effectLst>
-                <a:latin typeface="Press Start 2P"/>
-                <a:ea typeface="Press Start 2P"/>
-                <a:cs typeface="Press Start 2P"/>
-                <a:sym typeface="Press Start 2P"/>
-              </a:rPr>
-              <a:t>START</a:t>
-            </a:r>
-            <a:endParaRPr sz="1200" dirty="0">
-              <a:solidFill>
-                <a:schemeClr val="lt1"/>
-              </a:solidFill>
-              <a:effectLst>
-                <a:outerShdw blurRad="38100" dist="38100" dir="2700000" algn="tl">
-                  <a:srgbClr val="000000">
-                    <a:alpha val="43137"/>
-                  </a:srgbClr>
-                </a:outerShdw>
-              </a:effectLst>
-              <a:latin typeface="Press Start 2P"/>
-              <a:ea typeface="Press Start 2P"/>
-              <a:cs typeface="Press Start 2P"/>
-              <a:sym typeface="Press Start 2P"/>
-            </a:endParaRPr>
-          </a:p>
-        </p:txBody>
-      </p:sp>
-      <p:sp>
-        <p:nvSpPr>
-          <p:cNvPr id="16" name="Google Shape;73;p16">
-            <a:extLst>
-              <a:ext uri="{FF2B5EF4-FFF2-40B4-BE49-F238E27FC236}">
-                <a16:creationId xmlns:a16="http://schemas.microsoft.com/office/drawing/2014/main" id="{D2890E0A-037D-A9F9-B4FC-A4A61994C929}"/>
-              </a:ext>
-            </a:extLst>
-          </p:cNvPr>
-          <p:cNvSpPr/>
-          <p:nvPr/>
-        </p:nvSpPr>
-        <p:spPr>
-          <a:xfrm>
-            <a:off x="2325355" y="2417455"/>
-            <a:ext cx="1397794" cy="403200"/>
-          </a:xfrm>
-          <a:prstGeom prst="rect">
-            <a:avLst/>
-          </a:prstGeom>
-          <a:solidFill>
-            <a:srgbClr val="00B050"/>
-          </a:solidFill>
-          <a:ln w="38100" cap="flat" cmpd="sng">
-            <a:solidFill>
-              <a:schemeClr val="lt1"/>
-            </a:solidFill>
-            <a:prstDash val="solid"/>
-            <a:round/>
-            <a:headEnd type="none" w="sm" len="sm"/>
-            <a:tailEnd type="none" w="sm" len="sm"/>
-          </a:ln>
-        </p:spPr>
-        <p:txBody>
-          <a:bodyPr spcFirstLastPara="1" wrap="square" lIns="91425" tIns="91425" rIns="91425" bIns="91425" anchor="ctr" anchorCtr="0">
-            <a:noAutofit/>
-          </a:bodyPr>
-          <a:lstStyle/>
-          <a:p>
-            <a:pPr marL="0" lvl="0" indent="0" algn="ctr" rtl="0">
-              <a:spcBef>
-                <a:spcPts val="0"/>
-              </a:spcBef>
-              <a:spcAft>
-                <a:spcPts val="0"/>
-              </a:spcAft>
-              <a:buNone/>
-            </a:pPr>
-            <a:r>
-              <a:rPr lang="en-GB" sz="1200" dirty="0">
-                <a:solidFill>
-                  <a:schemeClr val="lt1"/>
-                </a:solidFill>
-                <a:effectLst>
-                  <a:outerShdw blurRad="38100" dist="38100" dir="2700000" algn="tl">
-                    <a:srgbClr val="000000">
-                      <a:alpha val="43137"/>
-                    </a:srgbClr>
-                  </a:outerShdw>
-                </a:effectLst>
-                <a:latin typeface="Press Start 2P"/>
-                <a:ea typeface="Press Start 2P"/>
-                <a:cs typeface="Press Start 2P"/>
-                <a:sym typeface="Press Start 2P"/>
-              </a:rPr>
-              <a:t>START</a:t>
-            </a:r>
-            <a:endParaRPr sz="1200" dirty="0">
-              <a:solidFill>
-                <a:schemeClr val="lt1"/>
-              </a:solidFill>
-              <a:effectLst>
-                <a:outerShdw blurRad="38100" dist="38100" dir="2700000" algn="tl">
-                  <a:srgbClr val="000000">
-                    <a:alpha val="43137"/>
-                  </a:srgbClr>
-                </a:outerShdw>
-              </a:effectLst>
-              <a:latin typeface="Press Start 2P"/>
-              <a:ea typeface="Press Start 2P"/>
-              <a:cs typeface="Press Start 2P"/>
-              <a:sym typeface="Press Start 2P"/>
-            </a:endParaRPr>
-          </a:p>
-        </p:txBody>
-      </p:sp>
-      <p:sp>
-        <p:nvSpPr>
           <p:cNvPr id="17" name="Google Shape;73;p16">
             <a:extLst>
               <a:ext uri="{FF2B5EF4-FFF2-40B4-BE49-F238E27FC236}">
@@ -7379,36 +6831,6 @@
       </p:sp>
       <p:pic>
         <p:nvPicPr>
-          <p:cNvPr id="19" name="Picture 18">
-            <a:extLst>
-              <a:ext uri="{FF2B5EF4-FFF2-40B4-BE49-F238E27FC236}">
-                <a16:creationId xmlns:a16="http://schemas.microsoft.com/office/drawing/2014/main" id="{1F51FB66-356C-EE42-CE38-676C04F55443}"/>
-              </a:ext>
-            </a:extLst>
-          </p:cNvPr>
-          <p:cNvPicPr>
-            <a:picLocks noChangeAspect="1"/>
-          </p:cNvPicPr>
-          <p:nvPr/>
-        </p:nvPicPr>
-        <p:blipFill>
-          <a:blip r:embed="rId4"/>
-          <a:stretch>
-            <a:fillRect/>
-          </a:stretch>
-        </p:blipFill>
-        <p:spPr>
-          <a:xfrm>
-            <a:off x="6113915" y="1550817"/>
-            <a:ext cx="714475" cy="504895"/>
-          </a:xfrm>
-          <a:prstGeom prst="rect">
-            <a:avLst/>
-          </a:prstGeom>
-        </p:spPr>
-      </p:pic>
-      <p:pic>
-        <p:nvPicPr>
           <p:cNvPr id="21" name="Picture 20">
             <a:extLst>
               <a:ext uri="{FF2B5EF4-FFF2-40B4-BE49-F238E27FC236}">
@@ -7422,7 +6844,7 @@
           <p:nvPr/>
         </p:nvPicPr>
         <p:blipFill>
-          <a:blip r:embed="rId5"/>
+          <a:blip r:embed="rId4"/>
           <a:stretch>
             <a:fillRect/>
           </a:stretch>
@@ -7709,6 +7131,482 @@
               <a:ea typeface="Press Start 2P"/>
               <a:cs typeface="Press Start 2P"/>
               <a:sym typeface="Press Start 2P"/>
+            </a:endParaRPr>
+          </a:p>
+        </p:txBody>
+      </p:sp>
+      <p:sp>
+        <p:nvSpPr>
+          <p:cNvPr id="23" name="Google Shape;72;p16">
+            <a:extLst>
+              <a:ext uri="{FF2B5EF4-FFF2-40B4-BE49-F238E27FC236}">
+                <a16:creationId xmlns:a16="http://schemas.microsoft.com/office/drawing/2014/main" id="{2472EB20-9A91-1A2E-B887-7EBC29B777FD}"/>
+              </a:ext>
+            </a:extLst>
+          </p:cNvPr>
+          <p:cNvSpPr/>
+          <p:nvPr/>
+        </p:nvSpPr>
+        <p:spPr>
+          <a:xfrm>
+            <a:off x="3381230" y="1284151"/>
+            <a:ext cx="1523809" cy="533333"/>
+          </a:xfrm>
+          <a:prstGeom prst="rect">
+            <a:avLst/>
+          </a:prstGeom>
+          <a:solidFill>
+            <a:srgbClr val="433232"/>
+          </a:solidFill>
+          <a:ln w="9525" cap="flat" cmpd="sng">
+            <a:solidFill>
+              <a:schemeClr val="dk1"/>
+            </a:solidFill>
+            <a:prstDash val="solid"/>
+            <a:round/>
+            <a:headEnd type="none" w="sm" len="sm"/>
+            <a:tailEnd type="none" w="sm" len="sm"/>
+          </a:ln>
+        </p:spPr>
+        <p:txBody>
+          <a:bodyPr spcFirstLastPara="1" wrap="square" lIns="91425" tIns="91425" rIns="91425" bIns="91425" anchor="ctr" anchorCtr="0">
+            <a:noAutofit/>
+          </a:bodyPr>
+          <a:lstStyle/>
+          <a:p>
+            <a:pPr marL="0" lvl="0" indent="0" algn="l" rtl="0">
+              <a:spcBef>
+                <a:spcPts val="0"/>
+              </a:spcBef>
+              <a:spcAft>
+                <a:spcPts val="0"/>
+              </a:spcAft>
+              <a:buNone/>
+            </a:pPr>
+            <a:endParaRPr/>
+          </a:p>
+        </p:txBody>
+      </p:sp>
+      <p:sp>
+        <p:nvSpPr>
+          <p:cNvPr id="24" name="Google Shape;73;p16">
+            <a:extLst>
+              <a:ext uri="{FF2B5EF4-FFF2-40B4-BE49-F238E27FC236}">
+                <a16:creationId xmlns:a16="http://schemas.microsoft.com/office/drawing/2014/main" id="{C670129B-7DED-6CF0-8ACD-4916D54526B5}"/>
+              </a:ext>
+            </a:extLst>
+          </p:cNvPr>
+          <p:cNvSpPr/>
+          <p:nvPr/>
+        </p:nvSpPr>
+        <p:spPr>
+          <a:xfrm>
+            <a:off x="3444237" y="1349217"/>
+            <a:ext cx="1397794" cy="403200"/>
+          </a:xfrm>
+          <a:prstGeom prst="rect">
+            <a:avLst/>
+          </a:prstGeom>
+          <a:solidFill>
+            <a:srgbClr val="00B050"/>
+          </a:solidFill>
+          <a:ln w="38100" cap="flat" cmpd="sng">
+            <a:solidFill>
+              <a:schemeClr val="lt1"/>
+            </a:solidFill>
+            <a:prstDash val="solid"/>
+            <a:round/>
+            <a:headEnd type="none" w="sm" len="sm"/>
+            <a:tailEnd type="none" w="sm" len="sm"/>
+          </a:ln>
+        </p:spPr>
+        <p:txBody>
+          <a:bodyPr spcFirstLastPara="1" wrap="square" lIns="91425" tIns="91425" rIns="91425" bIns="91425" anchor="ctr" anchorCtr="0">
+            <a:noAutofit/>
+          </a:bodyPr>
+          <a:lstStyle/>
+          <a:p>
+            <a:pPr marL="0" lvl="0" indent="0" algn="ctr" rtl="0">
+              <a:spcBef>
+                <a:spcPts val="0"/>
+              </a:spcBef>
+              <a:spcAft>
+                <a:spcPts val="0"/>
+              </a:spcAft>
+              <a:buNone/>
+            </a:pPr>
+            <a:r>
+              <a:rPr lang="en-GB" sz="1200" dirty="0">
+                <a:solidFill>
+                  <a:schemeClr val="lt1"/>
+                </a:solidFill>
+                <a:effectLst>
+                  <a:outerShdw blurRad="38100" dist="38100" dir="2700000" algn="tl">
+                    <a:srgbClr val="000000">
+                      <a:alpha val="43137"/>
+                    </a:srgbClr>
+                  </a:outerShdw>
+                </a:effectLst>
+                <a:latin typeface="Press Start 2P"/>
+                <a:ea typeface="Press Start 2P"/>
+                <a:cs typeface="Press Start 2P"/>
+                <a:sym typeface="Press Start 2P"/>
+              </a:rPr>
+              <a:t>RESUME</a:t>
+            </a:r>
+            <a:endParaRPr sz="1200" dirty="0">
+              <a:solidFill>
+                <a:schemeClr val="lt1"/>
+              </a:solidFill>
+              <a:effectLst>
+                <a:outerShdw blurRad="38100" dist="38100" dir="2700000" algn="tl">
+                  <a:srgbClr val="000000">
+                    <a:alpha val="43137"/>
+                  </a:srgbClr>
+                </a:outerShdw>
+              </a:effectLst>
+              <a:latin typeface="Press Start 2P"/>
+              <a:ea typeface="Press Start 2P"/>
+              <a:cs typeface="Press Start 2P"/>
+              <a:sym typeface="Press Start 2P"/>
+            </a:endParaRPr>
+          </a:p>
+        </p:txBody>
+      </p:sp>
+      <p:sp>
+        <p:nvSpPr>
+          <p:cNvPr id="25" name="Equals 24">
+            <a:extLst>
+              <a:ext uri="{FF2B5EF4-FFF2-40B4-BE49-F238E27FC236}">
+                <a16:creationId xmlns:a16="http://schemas.microsoft.com/office/drawing/2014/main" id="{7D2328F2-6B89-618F-7E47-67D3060D9F9B}"/>
+              </a:ext>
+            </a:extLst>
+          </p:cNvPr>
+          <p:cNvSpPr/>
+          <p:nvPr/>
+        </p:nvSpPr>
+        <p:spPr>
+          <a:xfrm rot="5400000">
+            <a:off x="2801844" y="2425463"/>
+            <a:ext cx="533332" cy="532800"/>
+          </a:xfrm>
+          <a:prstGeom prst="mathEqual">
+            <a:avLst/>
+          </a:prstGeom>
+          <a:solidFill>
+            <a:schemeClr val="bg1"/>
+          </a:solidFill>
+          <a:ln>
+            <a:solidFill>
+              <a:schemeClr val="tx1"/>
+            </a:solidFill>
+          </a:ln>
+          <a:effectLst>
+            <a:outerShdw blurRad="50800" dist="38100" dir="2700000" algn="tl" rotWithShape="0">
+              <a:prstClr val="black">
+                <a:alpha val="40000"/>
+              </a:prstClr>
+            </a:outerShdw>
+          </a:effectLst>
+        </p:spPr>
+        <p:style>
+          <a:lnRef idx="2">
+            <a:schemeClr val="accent1">
+              <a:shade val="50000"/>
+            </a:schemeClr>
+          </a:lnRef>
+          <a:fillRef idx="1">
+            <a:schemeClr val="accent1"/>
+          </a:fillRef>
+          <a:effectRef idx="0">
+            <a:schemeClr val="accent1"/>
+          </a:effectRef>
+          <a:fontRef idx="minor">
+            <a:schemeClr val="lt1"/>
+          </a:fontRef>
+        </p:style>
+        <p:txBody>
+          <a:bodyPr rtlCol="0" anchor="ctr"/>
+          <a:lstStyle/>
+          <a:p>
+            <a:pPr algn="ctr"/>
+            <a:endParaRPr lang="en-GB" dirty="0">
+              <a:solidFill>
+                <a:schemeClr val="tx1"/>
+              </a:solidFill>
+            </a:endParaRPr>
+          </a:p>
+        </p:txBody>
+      </p:sp>
+      <p:sp>
+        <p:nvSpPr>
+          <p:cNvPr id="26" name="Google Shape;73;p16">
+            <a:extLst>
+              <a:ext uri="{FF2B5EF4-FFF2-40B4-BE49-F238E27FC236}">
+                <a16:creationId xmlns:a16="http://schemas.microsoft.com/office/drawing/2014/main" id="{9319A9A0-EB56-CA4D-D9FA-28320628BE5A}"/>
+              </a:ext>
+            </a:extLst>
+          </p:cNvPr>
+          <p:cNvSpPr/>
+          <p:nvPr/>
+        </p:nvSpPr>
+        <p:spPr>
+          <a:xfrm>
+            <a:off x="4627516" y="2249331"/>
+            <a:ext cx="3099257" cy="778178"/>
+          </a:xfrm>
+          <a:prstGeom prst="rect">
+            <a:avLst/>
+          </a:prstGeom>
+          <a:noFill/>
+          <a:ln w="38100" cap="flat" cmpd="sng">
+            <a:noFill/>
+            <a:prstDash val="solid"/>
+            <a:round/>
+            <a:headEnd type="none" w="sm" len="sm"/>
+            <a:tailEnd type="none" w="sm" len="sm"/>
+          </a:ln>
+        </p:spPr>
+        <p:txBody>
+          <a:bodyPr spcFirstLastPara="1" wrap="square" lIns="91425" tIns="91425" rIns="91425" bIns="91425" anchor="ctr" anchorCtr="0">
+            <a:noAutofit/>
+          </a:bodyPr>
+          <a:lstStyle/>
+          <a:p>
+            <a:pPr marL="0" lvl="0" indent="0" algn="ctr" rtl="0">
+              <a:spcBef>
+                <a:spcPts val="0"/>
+              </a:spcBef>
+              <a:spcAft>
+                <a:spcPts val="0"/>
+              </a:spcAft>
+              <a:buNone/>
+            </a:pPr>
+            <a:r>
+              <a:rPr lang="en-GB" sz="1800" dirty="0">
+                <a:solidFill>
+                  <a:schemeClr val="accent4">
+                    <a:lumMod val="75000"/>
+                  </a:schemeClr>
+                </a:solidFill>
+                <a:effectLst>
+                  <a:outerShdw blurRad="38100" dist="38100" dir="2700000" algn="tl">
+                    <a:srgbClr val="000000">
+                      <a:alpha val="43137"/>
+                    </a:srgbClr>
+                  </a:outerShdw>
+                </a:effectLst>
+                <a:latin typeface="Press Start 2P"/>
+                <a:ea typeface="Press Start 2P"/>
+                <a:cs typeface="Press Start 2P"/>
+                <a:sym typeface="Press Start 2P"/>
+              </a:rPr>
+              <a:t>PAUSED</a:t>
+            </a:r>
+          </a:p>
+        </p:txBody>
+      </p:sp>
+      <p:sp>
+        <p:nvSpPr>
+          <p:cNvPr id="27" name="Rectangle 26">
+            <a:extLst>
+              <a:ext uri="{FF2B5EF4-FFF2-40B4-BE49-F238E27FC236}">
+                <a16:creationId xmlns:a16="http://schemas.microsoft.com/office/drawing/2014/main" id="{AF6FC8F2-07A9-5A2C-6AF5-415623F62125}"/>
+              </a:ext>
+            </a:extLst>
+          </p:cNvPr>
+          <p:cNvSpPr/>
+          <p:nvPr/>
+        </p:nvSpPr>
+        <p:spPr>
+          <a:xfrm>
+            <a:off x="1322258" y="2249331"/>
+            <a:ext cx="608400" cy="479788"/>
+          </a:xfrm>
+          <a:prstGeom prst="rect">
+            <a:avLst/>
+          </a:prstGeom>
+          <a:solidFill>
+            <a:srgbClr val="BC9862"/>
+          </a:solidFill>
+          <a:ln w="6350">
+            <a:solidFill>
+              <a:schemeClr val="tx1"/>
+            </a:solidFill>
+          </a:ln>
+        </p:spPr>
+        <p:style>
+          <a:lnRef idx="2">
+            <a:schemeClr val="accent1">
+              <a:shade val="50000"/>
+            </a:schemeClr>
+          </a:lnRef>
+          <a:fillRef idx="1">
+            <a:schemeClr val="accent1"/>
+          </a:fillRef>
+          <a:effectRef idx="0">
+            <a:schemeClr val="accent1"/>
+          </a:effectRef>
+          <a:fontRef idx="minor">
+            <a:schemeClr val="lt1"/>
+          </a:fontRef>
+        </p:style>
+        <p:txBody>
+          <a:bodyPr rtlCol="0" anchor="ctr"/>
+          <a:lstStyle/>
+          <a:p>
+            <a:pPr algn="ctr"/>
+            <a:r>
+              <a:rPr lang="en-GB" sz="900" dirty="0">
+                <a:solidFill>
+                  <a:srgbClr val="176C33"/>
+                </a:solidFill>
+                <a:effectLst>
+                  <a:outerShdw blurRad="38100" dist="38100" dir="2700000" algn="tl">
+                    <a:srgbClr val="000000">
+                      <a:alpha val="43137"/>
+                    </a:srgbClr>
+                  </a:outerShdw>
+                </a:effectLst>
+                <a:latin typeface="Old English Text MT" panose="03040902040508030806" pitchFamily="66" charset="0"/>
+              </a:rPr>
+              <a:t>Emerald Forest </a:t>
+            </a:r>
+            <a:r>
+              <a:rPr lang="en-GB" sz="900" dirty="0">
+                <a:solidFill>
+                  <a:srgbClr val="176C33"/>
+                </a:solidFill>
+                <a:effectLst>
+                  <a:outerShdw blurRad="38100" dist="38100" dir="2700000" algn="tl">
+                    <a:srgbClr val="000000">
+                      <a:alpha val="43137"/>
+                    </a:srgbClr>
+                  </a:outerShdw>
+                </a:effectLst>
+                <a:latin typeface="Old English Text MT" panose="03040902040508030806" pitchFamily="66" charset="0"/>
+                <a:sym typeface="Wingdings" panose="05000000000000000000" pitchFamily="2" charset="2"/>
+              </a:rPr>
+              <a:t></a:t>
+            </a:r>
+            <a:endParaRPr lang="en-GB" sz="900" dirty="0">
+              <a:solidFill>
+                <a:srgbClr val="176C33"/>
+              </a:solidFill>
+              <a:effectLst>
+                <a:outerShdw blurRad="38100" dist="38100" dir="2700000" algn="tl">
+                  <a:srgbClr val="000000">
+                    <a:alpha val="43137"/>
+                  </a:srgbClr>
+                </a:outerShdw>
+              </a:effectLst>
+              <a:latin typeface="Old English Text MT" panose="03040902040508030806" pitchFamily="66" charset="0"/>
+            </a:endParaRPr>
+          </a:p>
+        </p:txBody>
+      </p:sp>
+      <p:pic>
+        <p:nvPicPr>
+          <p:cNvPr id="1026" name="Picture 2" descr="placa | Nova Skin | Oak planks, Wood doors, Grey glass">
+            <a:extLst>
+              <a:ext uri="{FF2B5EF4-FFF2-40B4-BE49-F238E27FC236}">
+                <a16:creationId xmlns:a16="http://schemas.microsoft.com/office/drawing/2014/main" id="{9CD65E53-602F-3758-4455-7478EEFEA7FD}"/>
+              </a:ext>
+            </a:extLst>
+          </p:cNvPr>
+          <p:cNvPicPr>
+            <a:picLocks noChangeAspect="1" noChangeArrowheads="1"/>
+          </p:cNvPicPr>
+          <p:nvPr/>
+        </p:nvPicPr>
+        <p:blipFill>
+          <a:blip r:embed="rId5">
+            <a:extLst>
+              <a:ext uri="{28A0092B-C50C-407E-A947-70E740481C1C}">
+                <a14:useLocalDpi xmlns:a14="http://schemas.microsoft.com/office/drawing/2010/main" val="0"/>
+              </a:ext>
+            </a:extLst>
+          </a:blip>
+          <a:srcRect/>
+          <a:stretch>
+            <a:fillRect/>
+          </a:stretch>
+        </p:blipFill>
+        <p:spPr bwMode="auto">
+          <a:xfrm>
+            <a:off x="1794414" y="3692520"/>
+            <a:ext cx="921590" cy="1003945"/>
+          </a:xfrm>
+          <a:prstGeom prst="rect">
+            <a:avLst/>
+          </a:prstGeom>
+          <a:noFill/>
+          <a:extLst>
+            <a:ext uri="{909E8E84-426E-40DD-AFC4-6F175D3DCCD1}">
+              <a14:hiddenFill xmlns:a14="http://schemas.microsoft.com/office/drawing/2010/main">
+                <a:solidFill>
+                  <a:srgbClr val="FFFFFF"/>
+                </a:solidFill>
+              </a14:hiddenFill>
+            </a:ext>
+          </a:extLst>
+        </p:spPr>
+      </p:pic>
+      <p:sp>
+        <p:nvSpPr>
+          <p:cNvPr id="28" name="Rectangle 27">
+            <a:extLst>
+              <a:ext uri="{FF2B5EF4-FFF2-40B4-BE49-F238E27FC236}">
+                <a16:creationId xmlns:a16="http://schemas.microsoft.com/office/drawing/2014/main" id="{11685C2A-9996-17EE-96A2-B524284A401A}"/>
+              </a:ext>
+            </a:extLst>
+          </p:cNvPr>
+          <p:cNvSpPr/>
+          <p:nvPr/>
+        </p:nvSpPr>
+        <p:spPr>
+          <a:xfrm rot="5400000">
+            <a:off x="1541568" y="2791149"/>
+            <a:ext cx="169779" cy="45719"/>
+          </a:xfrm>
+          <a:prstGeom prst="rect">
+            <a:avLst/>
+          </a:prstGeom>
+          <a:solidFill>
+            <a:srgbClr val="BC9862"/>
+          </a:solidFill>
+          <a:ln w="6350">
+            <a:solidFill>
+              <a:schemeClr val="tx1"/>
+            </a:solidFill>
+          </a:ln>
+        </p:spPr>
+        <p:style>
+          <a:lnRef idx="2">
+            <a:schemeClr val="accent1">
+              <a:shade val="50000"/>
+            </a:schemeClr>
+          </a:lnRef>
+          <a:fillRef idx="1">
+            <a:schemeClr val="accent1"/>
+          </a:fillRef>
+          <a:effectRef idx="0">
+            <a:schemeClr val="accent1"/>
+          </a:effectRef>
+          <a:fontRef idx="minor">
+            <a:schemeClr val="lt1"/>
+          </a:fontRef>
+        </p:style>
+        <p:txBody>
+          <a:bodyPr rtlCol="0" anchor="ctr"/>
+          <a:lstStyle/>
+          <a:p>
+            <a:pPr algn="ctr"/>
+            <a:endParaRPr lang="en-GB" sz="900" dirty="0">
+              <a:solidFill>
+                <a:schemeClr val="tx1"/>
+              </a:solidFill>
+              <a:latin typeface="Old English Text MT" panose="03040902040508030806" pitchFamily="66" charset="0"/>
             </a:endParaRPr>
           </a:p>
         </p:txBody>

</xml_diff>